<commit_message>
removing my api key
</commit_message>
<xml_diff>
--- a/Diplodocus Team.pptx
+++ b/Diplodocus Team.pptx
@@ -7,11 +7,12 @@
   <p:sldIdLst>
     <p:sldId id="256" r:id="rId2"/>
     <p:sldId id="259" r:id="rId3"/>
-    <p:sldId id="258" r:id="rId4"/>
-    <p:sldId id="264" r:id="rId5"/>
-    <p:sldId id="262" r:id="rId6"/>
-    <p:sldId id="263" r:id="rId7"/>
-    <p:sldId id="260" r:id="rId8"/>
+    <p:sldId id="265" r:id="rId4"/>
+    <p:sldId id="258" r:id="rId5"/>
+    <p:sldId id="264" r:id="rId6"/>
+    <p:sldId id="262" r:id="rId7"/>
+    <p:sldId id="263" r:id="rId8"/>
+    <p:sldId id="260" r:id="rId9"/>
   </p:sldIdLst>
   <p:sldSz cx="12192000" cy="6858000"/>
   <p:notesSz cx="6858000" cy="9144000"/>
@@ -265,7 +266,7 @@
           <a:p>
             <a:fld id="{758FCCAE-DEDE-40CE-9962-666D00D50A2D}" type="datetimeFigureOut">
               <a:rPr lang="en-US" smtClean="0"/>
-              <a:t>7/28/2021</a:t>
+              <a:t>7/31/2021</a:t>
             </a:fld>
             <a:endParaRPr lang="en-US"/>
           </a:p>
@@ -463,7 +464,7 @@
           <a:p>
             <a:fld id="{758FCCAE-DEDE-40CE-9962-666D00D50A2D}" type="datetimeFigureOut">
               <a:rPr lang="en-US" smtClean="0"/>
-              <a:t>7/28/2021</a:t>
+              <a:t>7/31/2021</a:t>
             </a:fld>
             <a:endParaRPr lang="en-US"/>
           </a:p>
@@ -671,7 +672,7 @@
           <a:p>
             <a:fld id="{758FCCAE-DEDE-40CE-9962-666D00D50A2D}" type="datetimeFigureOut">
               <a:rPr lang="en-US" smtClean="0"/>
-              <a:t>7/28/2021</a:t>
+              <a:t>7/31/2021</a:t>
             </a:fld>
             <a:endParaRPr lang="en-US"/>
           </a:p>
@@ -869,7 +870,7 @@
           <a:p>
             <a:fld id="{758FCCAE-DEDE-40CE-9962-666D00D50A2D}" type="datetimeFigureOut">
               <a:rPr lang="en-US" smtClean="0"/>
-              <a:t>7/28/2021</a:t>
+              <a:t>7/31/2021</a:t>
             </a:fld>
             <a:endParaRPr lang="en-US"/>
           </a:p>
@@ -1144,7 +1145,7 @@
           <a:p>
             <a:fld id="{758FCCAE-DEDE-40CE-9962-666D00D50A2D}" type="datetimeFigureOut">
               <a:rPr lang="en-US" smtClean="0"/>
-              <a:t>7/28/2021</a:t>
+              <a:t>7/31/2021</a:t>
             </a:fld>
             <a:endParaRPr lang="en-US"/>
           </a:p>
@@ -1409,7 +1410,7 @@
           <a:p>
             <a:fld id="{758FCCAE-DEDE-40CE-9962-666D00D50A2D}" type="datetimeFigureOut">
               <a:rPr lang="en-US" smtClean="0"/>
-              <a:t>7/28/2021</a:t>
+              <a:t>7/31/2021</a:t>
             </a:fld>
             <a:endParaRPr lang="en-US"/>
           </a:p>
@@ -1821,7 +1822,7 @@
           <a:p>
             <a:fld id="{758FCCAE-DEDE-40CE-9962-666D00D50A2D}" type="datetimeFigureOut">
               <a:rPr lang="en-US" smtClean="0"/>
-              <a:t>7/28/2021</a:t>
+              <a:t>7/31/2021</a:t>
             </a:fld>
             <a:endParaRPr lang="en-US"/>
           </a:p>
@@ -1962,7 +1963,7 @@
           <a:p>
             <a:fld id="{758FCCAE-DEDE-40CE-9962-666D00D50A2D}" type="datetimeFigureOut">
               <a:rPr lang="en-US" smtClean="0"/>
-              <a:t>7/28/2021</a:t>
+              <a:t>7/31/2021</a:t>
             </a:fld>
             <a:endParaRPr lang="en-US"/>
           </a:p>
@@ -2075,7 +2076,7 @@
           <a:p>
             <a:fld id="{758FCCAE-DEDE-40CE-9962-666D00D50A2D}" type="datetimeFigureOut">
               <a:rPr lang="en-US" smtClean="0"/>
-              <a:t>7/28/2021</a:t>
+              <a:t>7/31/2021</a:t>
             </a:fld>
             <a:endParaRPr lang="en-US"/>
           </a:p>
@@ -2386,7 +2387,7 @@
           <a:p>
             <a:fld id="{758FCCAE-DEDE-40CE-9962-666D00D50A2D}" type="datetimeFigureOut">
               <a:rPr lang="en-US" smtClean="0"/>
-              <a:t>7/28/2021</a:t>
+              <a:t>7/31/2021</a:t>
             </a:fld>
             <a:endParaRPr lang="en-US"/>
           </a:p>
@@ -2674,7 +2675,7 @@
           <a:p>
             <a:fld id="{758FCCAE-DEDE-40CE-9962-666D00D50A2D}" type="datetimeFigureOut">
               <a:rPr lang="en-US" smtClean="0"/>
-              <a:t>7/28/2021</a:t>
+              <a:t>7/31/2021</a:t>
             </a:fld>
             <a:endParaRPr lang="en-US"/>
           </a:p>
@@ -2915,7 +2916,7 @@
           <a:p>
             <a:fld id="{758FCCAE-DEDE-40CE-9962-666D00D50A2D}" type="datetimeFigureOut">
               <a:rPr lang="en-US" smtClean="0"/>
-              <a:t>7/28/2021</a:t>
+              <a:t>7/31/2021</a:t>
             </a:fld>
             <a:endParaRPr lang="en-US"/>
           </a:p>
@@ -3482,7 +3483,7 @@
         <p:spPr/>
         <p:txBody>
           <a:bodyPr>
-            <a:normAutofit fontScale="92500" lnSpcReduction="10000"/>
+            <a:normAutofit fontScale="92500" lnSpcReduction="20000"/>
           </a:bodyPr>
           <a:lstStyle/>
           <a:p>
@@ -3553,28 +3554,25 @@
             <a:pPr lvl="2"/>
             <a:r>
               <a:rPr lang="en-US" dirty="0"/>
-              <a:t>Csv file: </a:t>
+              <a:t>Csv file: Resources/airbnb_data.csv</a:t>
+            </a:r>
+          </a:p>
+          <a:p>
+            <a:pPr lvl="2"/>
+            <a:r>
+              <a:rPr lang="en-US" dirty="0"/>
+              <a:t>Population: </a:t>
             </a:r>
             <a:r>
               <a:rPr lang="en-US" dirty="0">
                 <a:hlinkClick r:id="rId2"/>
               </a:rPr>
-              <a:t>https://www.kaggle.com/kritikseth/us-airbnb-open-data</a:t>
+              <a:t>http://public.opendatasoft.com/api/records/1.0/search/?dataset=cities-and-towns-of-the-united-states%40public&amp;q={city}&amp;facet=name&amp;facet=state&amp;refine.name={City}&amp;refine.state={state}</a:t>
             </a:r>
             <a:endParaRPr lang="en-US" dirty="0"/>
           </a:p>
           <a:p>
             <a:pPr lvl="2"/>
-            <a:r>
-              <a:rPr lang="en-US" dirty="0"/>
-              <a:t>API: </a:t>
-            </a:r>
-            <a:r>
-              <a:rPr lang="en-US" dirty="0">
-                <a:hlinkClick r:id="rId3"/>
-              </a:rPr>
-              <a:t>https://www.google.com/amp/s/rapidapi.com/blog/airbnb-api-python/amp/</a:t>
-            </a:r>
             <a:endParaRPr lang="en-US" dirty="0"/>
           </a:p>
           <a:p>
@@ -3620,6 +3618,157 @@
           <p:cNvPr id="2" name="Title 1">
             <a:extLst>
               <a:ext uri="{FF2B5EF4-FFF2-40B4-BE49-F238E27FC236}">
+                <a16:creationId xmlns:a16="http://schemas.microsoft.com/office/drawing/2014/main" id="{3B8AB6E0-D6B9-4FDF-A884-95692C93257D}"/>
+              </a:ext>
+            </a:extLst>
+          </p:cNvPr>
+          <p:cNvSpPr>
+            <a:spLocks noGrp="1"/>
+          </p:cNvSpPr>
+          <p:nvPr>
+            <p:ph type="title"/>
+          </p:nvPr>
+        </p:nvSpPr>
+        <p:spPr/>
+        <p:txBody>
+          <a:bodyPr/>
+          <a:lstStyle/>
+          <a:p>
+            <a:r>
+              <a:rPr lang="en-US" dirty="0"/>
+              <a:t>Summary</a:t>
+            </a:r>
+          </a:p>
+        </p:txBody>
+      </p:sp>
+      <p:sp>
+        <p:nvSpPr>
+          <p:cNvPr id="3" name="Content Placeholder 2">
+            <a:extLst>
+              <a:ext uri="{FF2B5EF4-FFF2-40B4-BE49-F238E27FC236}">
+                <a16:creationId xmlns:a16="http://schemas.microsoft.com/office/drawing/2014/main" id="{67FAB5D6-0EFE-49ED-A06C-A46659529716}"/>
+              </a:ext>
+            </a:extLst>
+          </p:cNvPr>
+          <p:cNvSpPr>
+            <a:spLocks noGrp="1"/>
+          </p:cNvSpPr>
+          <p:nvPr>
+            <p:ph idx="1"/>
+          </p:nvPr>
+        </p:nvSpPr>
+        <p:spPr/>
+        <p:txBody>
+          <a:bodyPr/>
+          <a:lstStyle/>
+          <a:p>
+            <a:pPr marL="0" marR="0">
+              <a:lnSpc>
+                <a:spcPct val="107000"/>
+              </a:lnSpc>
+              <a:spcBef>
+                <a:spcPts val="0"/>
+              </a:spcBef>
+              <a:spcAft>
+                <a:spcPts val="800"/>
+              </a:spcAft>
+            </a:pPr>
+            <a:r>
+              <a:rPr lang="en-US" sz="1800" dirty="0">
+                <a:effectLst/>
+                <a:latin typeface="Calibri" panose="020F0502020204030204" pitchFamily="34" charset="0"/>
+                <a:ea typeface="Calibri" panose="020F0502020204030204" pitchFamily="34" charset="0"/>
+                <a:cs typeface="Times New Roman" panose="02020603050405020304" pitchFamily="18" charset="0"/>
+              </a:rPr>
+              <a:t>Since its inception in 2008, Airbnb has disrupted the traditional hospitality industry as more travelers decide to use Airbnb as their primary means of accommodation. Airbnb offers travelers a more unique and personalized way of accommodation and experience.</a:t>
+            </a:r>
+          </a:p>
+          <a:p>
+            <a:pPr marL="0" marR="0">
+              <a:lnSpc>
+                <a:spcPct val="107000"/>
+              </a:lnSpc>
+              <a:spcBef>
+                <a:spcPts val="0"/>
+              </a:spcBef>
+              <a:spcAft>
+                <a:spcPts val="800"/>
+              </a:spcAft>
+            </a:pPr>
+            <a:endParaRPr lang="en-US" sz="1800" dirty="0">
+              <a:effectLst/>
+              <a:latin typeface="Calibri" panose="020F0502020204030204" pitchFamily="34" charset="0"/>
+              <a:ea typeface="Calibri" panose="020F0502020204030204" pitchFamily="34" charset="0"/>
+              <a:cs typeface="Times New Roman" panose="02020603050405020304" pitchFamily="18" charset="0"/>
+            </a:endParaRPr>
+          </a:p>
+          <a:p>
+            <a:pPr marL="0" marR="0">
+              <a:lnSpc>
+                <a:spcPct val="107000"/>
+              </a:lnSpc>
+              <a:spcBef>
+                <a:spcPts val="0"/>
+              </a:spcBef>
+              <a:spcAft>
+                <a:spcPts val="800"/>
+              </a:spcAft>
+            </a:pPr>
+            <a:r>
+              <a:rPr lang="en-US" sz="1800" dirty="0">
+                <a:effectLst/>
+                <a:latin typeface="Calibri" panose="020F0502020204030204" pitchFamily="34" charset="0"/>
+                <a:ea typeface="Calibri" panose="020F0502020204030204" pitchFamily="34" charset="0"/>
+                <a:cs typeface="Times New Roman" panose="02020603050405020304" pitchFamily="18" charset="0"/>
+              </a:rPr>
+              <a:t>This dataset has one file- airbnb_data.csv which has columns describing features such as host id, hostname, listing id, listing name, latitude and longitude of listing, the neighborhood, price, room type, minimum number of nights, number of reviews, last review date, reviews per month, availability, host listings and city.</a:t>
+            </a:r>
+          </a:p>
+          <a:p>
+            <a:endParaRPr lang="en-US" dirty="0">
+              <a:latin typeface="Inter"/>
+            </a:endParaRPr>
+          </a:p>
+          <a:p>
+            <a:endParaRPr lang="en-US" dirty="0"/>
+          </a:p>
+        </p:txBody>
+      </p:sp>
+    </p:spTree>
+    <p:extLst>
+      <p:ext uri="{BB962C8B-B14F-4D97-AF65-F5344CB8AC3E}">
+        <p14:creationId xmlns:p14="http://schemas.microsoft.com/office/powerpoint/2010/main" val="1628321247"/>
+      </p:ext>
+    </p:extLst>
+  </p:cSld>
+  <p:clrMapOvr>
+    <a:masterClrMapping/>
+  </p:clrMapOvr>
+</p:sld>
+</file>
+
+<file path=ppt/slides/slide4.xml><?xml version="1.0" encoding="utf-8"?>
+<p:sld xmlns:a="http://schemas.openxmlformats.org/drawingml/2006/main" xmlns:r="http://schemas.openxmlformats.org/officeDocument/2006/relationships" xmlns:p="http://schemas.openxmlformats.org/presentationml/2006/main">
+  <p:cSld>
+    <p:spTree>
+      <p:nvGrpSpPr>
+        <p:cNvPr id="1" name=""/>
+        <p:cNvGrpSpPr/>
+        <p:nvPr/>
+      </p:nvGrpSpPr>
+      <p:grpSpPr>
+        <a:xfrm>
+          <a:off x="0" y="0"/>
+          <a:ext cx="0" cy="0"/>
+          <a:chOff x="0" y="0"/>
+          <a:chExt cx="0" cy="0"/>
+        </a:xfrm>
+      </p:grpSpPr>
+      <p:sp>
+        <p:nvSpPr>
+          <p:cNvPr id="2" name="Title 1">
+            <a:extLst>
+              <a:ext uri="{FF2B5EF4-FFF2-40B4-BE49-F238E27FC236}">
                 <a16:creationId xmlns:a16="http://schemas.microsoft.com/office/drawing/2014/main" id="{F1EEF30B-1F3C-4C87-986D-D4DBC2FF706E}"/>
               </a:ext>
             </a:extLst>
@@ -4061,7 +4210,7 @@
 </p:sld>
 </file>
 
-<file path=ppt/slides/slide4.xml><?xml version="1.0" encoding="utf-8"?>
+<file path=ppt/slides/slide5.xml><?xml version="1.0" encoding="utf-8"?>
 <p:sld xmlns:a="http://schemas.openxmlformats.org/drawingml/2006/main" xmlns:r="http://schemas.openxmlformats.org/officeDocument/2006/relationships" xmlns:p="http://schemas.openxmlformats.org/presentationml/2006/main">
   <p:cSld>
     <p:spTree>
@@ -4256,7 +4405,7 @@
 </p:sld>
 </file>
 
-<file path=ppt/slides/slide5.xml><?xml version="1.0" encoding="utf-8"?>
+<file path=ppt/slides/slide6.xml><?xml version="1.0" encoding="utf-8"?>
 <p:sld xmlns:a="http://schemas.openxmlformats.org/drawingml/2006/main" xmlns:r="http://schemas.openxmlformats.org/officeDocument/2006/relationships" xmlns:p="http://schemas.openxmlformats.org/presentationml/2006/main">
   <p:cSld>
     <p:spTree>
@@ -5076,7 +5225,7 @@
 </p:sld>
 </file>
 
-<file path=ppt/slides/slide6.xml><?xml version="1.0" encoding="utf-8"?>
+<file path=ppt/slides/slide7.xml><?xml version="1.0" encoding="utf-8"?>
 <p:sld xmlns:a="http://schemas.openxmlformats.org/drawingml/2006/main" xmlns:r="http://schemas.openxmlformats.org/officeDocument/2006/relationships" xmlns:p="http://schemas.openxmlformats.org/presentationml/2006/main">
   <p:cSld>
     <p:spTree>
@@ -5205,7 +5354,7 @@
 </p:sld>
 </file>
 
-<file path=ppt/slides/slide7.xml><?xml version="1.0" encoding="utf-8"?>
+<file path=ppt/slides/slide8.xml><?xml version="1.0" encoding="utf-8"?>
 <p:sld xmlns:a="http://schemas.openxmlformats.org/drawingml/2006/main" xmlns:r="http://schemas.openxmlformats.org/officeDocument/2006/relationships" xmlns:p="http://schemas.openxmlformats.org/presentationml/2006/main">
   <p:cSld>
     <p:spTree>

</xml_diff>